<commit_message>
[doc] (plan de test): Update plan test gestion ToDo
</commit_message>
<xml_diff>
--- a/WIP/plan de test/planTestCreationToDo.pptx
+++ b/WIP/plan de test/planTestCreationToDo.pptx
@@ -4550,42 +4550,20 @@
                 </a:rPr>
                 <a:t>Données de test:</a:t>
               </a:r>
-            </a:p>
-            <a:p>
-              <a:pPr marL="0" marR="0" lvl="0" indent="0" algn="l" defTabSz="1333500" rtl="0" eaLnBrk="1" fontAlgn="auto" latinLnBrk="0" hangingPunct="1">
-                <a:lnSpc>
-                  <a:spcPct val="90000"/>
-                </a:lnSpc>
-                <a:spcBef>
-                  <a:spcPct val="0"/>
-                </a:spcBef>
-                <a:spcAft>
-                  <a:spcPct val="35000"/>
-                </a:spcAft>
-                <a:buClrTx/>
-                <a:buSzTx/>
-                <a:buFontTx/>
-                <a:buNone/>
-                <a:tabLst/>
-                <a:defRPr/>
-              </a:pPr>
-              <a:r>
-                <a:rPr kumimoji="0" lang="fr-FR" sz="1400" b="0" i="0" u="none" strike="noStrike" kern="1200" cap="none" spc="0" normalizeH="0" baseline="0" noProof="0" dirty="0">
-                  <a:ln>
-                    <a:noFill/>
-                  </a:ln>
-                  <a:solidFill>
-                    <a:prstClr val="white"/>
-                  </a:solidFill>
-                  <a:effectLst/>
-                  <a:uLnTx/>
-                  <a:uFillTx/>
-                  <a:latin typeface="Calibri" panose="020F0502020204030204"/>
-                  <a:ea typeface="+mn-ea"/>
-                  <a:cs typeface="+mn-cs"/>
-                </a:rPr>
-                <a:t>Faux compte utilisateurs</a:t>
-              </a:r>
+              <a:endParaRPr kumimoji="0" lang="fr-FR" sz="1400" b="0" i="0" u="none" strike="noStrike" kern="1200" cap="none" spc="0" normalizeH="0" baseline="0" noProof="0" dirty="0">
+                <a:ln>
+                  <a:noFill/>
+                </a:ln>
+                <a:solidFill>
+                  <a:prstClr val="white"/>
+                </a:solidFill>
+                <a:effectLst/>
+                <a:uLnTx/>
+                <a:uFillTx/>
+                <a:latin typeface="Calibri" panose="020F0502020204030204"/>
+                <a:ea typeface="+mn-ea"/>
+                <a:cs typeface="+mn-cs"/>
+              </a:endParaRPr>
             </a:p>
             <a:p>
               <a:pPr marL="0" marR="0" lvl="0" indent="0" algn="l" defTabSz="1333500" rtl="0" eaLnBrk="1" fontAlgn="auto" latinLnBrk="0" hangingPunct="1">
@@ -5969,6 +5947,26 @@
 </file>
 
 <file path=customXml/item1.xml><?xml version="1.0" encoding="utf-8"?>
+<?mso-contentType ?>
+<FormTemplates xmlns="http://schemas.microsoft.com/sharepoint/v3/contenttype/forms">
+  <Display>DocumentLibraryForm</Display>
+  <Edit>DocumentLibraryForm</Edit>
+  <New>DocumentLibraryForm</New>
+</FormTemplates>
+</file>
+
+<file path=customXml/item2.xml><?xml version="1.0" encoding="utf-8"?>
+<p:properties xmlns:p="http://schemas.microsoft.com/office/2006/metadata/properties" xmlns:xsi="http://www.w3.org/2001/XMLSchema-instance" xmlns:pc="http://schemas.microsoft.com/office/infopath/2007/PartnerControls">
+  <documentManagement>
+    <lcf76f155ced4ddcb4097134ff3c332f xmlns="b5cf4370-ac38-4b9e-9836-ef6f5df64f24">
+      <Terms xmlns="http://schemas.microsoft.com/office/infopath/2007/PartnerControls"/>
+    </lcf76f155ced4ddcb4097134ff3c332f>
+    <TaxCatchAll xmlns="eefa3612-053e-497a-ae76-8a76877f5e22" xsi:nil="true"/>
+  </documentManagement>
+</p:properties>
+</file>
+
+<file path=customXml/item3.xml><?xml version="1.0" encoding="utf-8"?>
 <ct:contentTypeSchema xmlns:ct="http://schemas.microsoft.com/office/2006/metadata/contentType" xmlns:ma="http://schemas.microsoft.com/office/2006/metadata/properties/metaAttributes" ct:_="" ma:_="" ma:contentTypeName="Document" ma:contentTypeID="0x01010080C9F2488912074FB587B9AD9ADAE5BB" ma:contentTypeVersion="11" ma:contentTypeDescription="Crée un document." ma:contentTypeScope="" ma:versionID="1bebaa2d391e7c30de2dcb588a772684">
   <xsd:schema xmlns:xsd="http://www.w3.org/2001/XMLSchema" xmlns:xs="http://www.w3.org/2001/XMLSchema" xmlns:p="http://schemas.microsoft.com/office/2006/metadata/properties" xmlns:ns2="b5cf4370-ac38-4b9e-9836-ef6f5df64f24" xmlns:ns3="eefa3612-053e-497a-ae76-8a76877f5e22" targetNamespace="http://schemas.microsoft.com/office/2006/metadata/properties" ma:root="true" ma:fieldsID="071e4af5f84e298b60331b8e79120627" ns2:_="" ns3:_="">
     <xsd:import namespace="b5cf4370-ac38-4b9e-9836-ef6f5df64f24"/>
@@ -6163,27 +6161,26 @@
 </ct:contentTypeSchema>
 </file>
 
-<file path=customXml/item2.xml><?xml version="1.0" encoding="utf-8"?>
-<p:properties xmlns:p="http://schemas.microsoft.com/office/2006/metadata/properties" xmlns:xsi="http://www.w3.org/2001/XMLSchema-instance" xmlns:pc="http://schemas.microsoft.com/office/infopath/2007/PartnerControls">
-  <documentManagement>
-    <lcf76f155ced4ddcb4097134ff3c332f xmlns="b5cf4370-ac38-4b9e-9836-ef6f5df64f24">
-      <Terms xmlns="http://schemas.microsoft.com/office/infopath/2007/PartnerControls"/>
-    </lcf76f155ced4ddcb4097134ff3c332f>
-    <TaxCatchAll xmlns="eefa3612-053e-497a-ae76-8a76877f5e22" xsi:nil="true"/>
-  </documentManagement>
-</p:properties>
+<file path=customXml/itemProps1.xml><?xml version="1.0" encoding="utf-8"?>
+<ds:datastoreItem xmlns:ds="http://schemas.openxmlformats.org/officeDocument/2006/customXml" ds:itemID="{64DB6A9B-4014-4350-8FE6-F72DA25DFBDF}">
+  <ds:schemaRefs>
+    <ds:schemaRef ds:uri="http://schemas.microsoft.com/sharepoint/v3/contenttype/forms"/>
+  </ds:schemaRefs>
+</ds:datastoreItem>
 </file>
 
-<file path=customXml/item3.xml><?xml version="1.0" encoding="utf-8"?>
-<?mso-contentType ?>
-<FormTemplates xmlns="http://schemas.microsoft.com/sharepoint/v3/contenttype/forms">
-  <Display>DocumentLibraryForm</Display>
-  <Edit>DocumentLibraryForm</Edit>
-  <New>DocumentLibraryForm</New>
-</FormTemplates>
+<file path=customXml/itemProps2.xml><?xml version="1.0" encoding="utf-8"?>
+<ds:datastoreItem xmlns:ds="http://schemas.openxmlformats.org/officeDocument/2006/customXml" ds:itemID="{8A70AF45-36D6-4247-AA7E-6372E9B9F7E1}">
+  <ds:schemaRefs>
+    <ds:schemaRef ds:uri="http://schemas.microsoft.com/office/2006/metadata/properties"/>
+    <ds:schemaRef ds:uri="http://schemas.microsoft.com/office/infopath/2007/PartnerControls"/>
+    <ds:schemaRef ds:uri="b5cf4370-ac38-4b9e-9836-ef6f5df64f24"/>
+    <ds:schemaRef ds:uri="eefa3612-053e-497a-ae76-8a76877f5e22"/>
+  </ds:schemaRefs>
+</ds:datastoreItem>
 </file>
 
-<file path=customXml/itemProps1.xml><?xml version="1.0" encoding="utf-8"?>
+<file path=customXml/itemProps3.xml><?xml version="1.0" encoding="utf-8"?>
 <ds:datastoreItem xmlns:ds="http://schemas.openxmlformats.org/officeDocument/2006/customXml" ds:itemID="{C2099935-ADE8-4E25-82AD-270299869B08}">
   <ds:schemaRefs>
     <ds:schemaRef ds:uri="http://schemas.microsoft.com/office/2006/metadata/contentType"/>
@@ -6200,23 +6197,4 @@
     <ds:schemaRef ds:uri="http://schemas.microsoft.com/internal/obd"/>
   </ds:schemaRefs>
 </ds:datastoreItem>
-</file>
-
-<file path=customXml/itemProps2.xml><?xml version="1.0" encoding="utf-8"?>
-<ds:datastoreItem xmlns:ds="http://schemas.openxmlformats.org/officeDocument/2006/customXml" ds:itemID="{8A70AF45-36D6-4247-AA7E-6372E9B9F7E1}">
-  <ds:schemaRefs>
-    <ds:schemaRef ds:uri="http://schemas.microsoft.com/office/2006/metadata/properties"/>
-    <ds:schemaRef ds:uri="http://schemas.microsoft.com/office/infopath/2007/PartnerControls"/>
-    <ds:schemaRef ds:uri="b5cf4370-ac38-4b9e-9836-ef6f5df64f24"/>
-    <ds:schemaRef ds:uri="eefa3612-053e-497a-ae76-8a76877f5e22"/>
-  </ds:schemaRefs>
-</ds:datastoreItem>
-</file>
-
-<file path=customXml/itemProps3.xml><?xml version="1.0" encoding="utf-8"?>
-<ds:datastoreItem xmlns:ds="http://schemas.openxmlformats.org/officeDocument/2006/customXml" ds:itemID="{64DB6A9B-4014-4350-8FE6-F72DA25DFBDF}">
-  <ds:schemaRefs>
-    <ds:schemaRef ds:uri="http://schemas.microsoft.com/sharepoint/v3/contenttype/forms"/>
-  </ds:schemaRefs>
-</ds:datastoreItem>
 </file>
</xml_diff>